<commit_message>
A mitad de las correcciones de las diapo
</commit_message>
<xml_diff>
--- a/Diapositivas/Articulo S1009A.pptx
+++ b/Diapositivas/Articulo S1009A.pptx
@@ -278,7 +278,7 @@
           <a:p>
             <a:fld id="{56797478-F4C9-45FC-904A-B410162781D6}" type="datetimeFigureOut">
               <a:rPr lang="es-MX" smtClean="0"/>
-              <a:t>06/06/2024</a:t>
+              <a:t>09/06/2024</a:t>
             </a:fld>
             <a:endParaRPr lang="es-MX"/>
           </a:p>
@@ -478,7 +478,7 @@
           <a:p>
             <a:fld id="{56797478-F4C9-45FC-904A-B410162781D6}" type="datetimeFigureOut">
               <a:rPr lang="es-MX" smtClean="0"/>
-              <a:t>06/06/2024</a:t>
+              <a:t>09/06/2024</a:t>
             </a:fld>
             <a:endParaRPr lang="es-MX"/>
           </a:p>
@@ -688,7 +688,7 @@
           <a:p>
             <a:fld id="{56797478-F4C9-45FC-904A-B410162781D6}" type="datetimeFigureOut">
               <a:rPr lang="es-MX" smtClean="0"/>
-              <a:t>06/06/2024</a:t>
+              <a:t>09/06/2024</a:t>
             </a:fld>
             <a:endParaRPr lang="es-MX"/>
           </a:p>
@@ -888,7 +888,7 @@
           <a:p>
             <a:fld id="{56797478-F4C9-45FC-904A-B410162781D6}" type="datetimeFigureOut">
               <a:rPr lang="es-MX" smtClean="0"/>
-              <a:t>06/06/2024</a:t>
+              <a:t>09/06/2024</a:t>
             </a:fld>
             <a:endParaRPr lang="es-MX"/>
           </a:p>
@@ -1164,7 +1164,7 @@
           <a:p>
             <a:fld id="{56797478-F4C9-45FC-904A-B410162781D6}" type="datetimeFigureOut">
               <a:rPr lang="es-MX" smtClean="0"/>
-              <a:t>06/06/2024</a:t>
+              <a:t>09/06/2024</a:t>
             </a:fld>
             <a:endParaRPr lang="es-MX"/>
           </a:p>
@@ -1432,7 +1432,7 @@
           <a:p>
             <a:fld id="{56797478-F4C9-45FC-904A-B410162781D6}" type="datetimeFigureOut">
               <a:rPr lang="es-MX" smtClean="0"/>
-              <a:t>06/06/2024</a:t>
+              <a:t>09/06/2024</a:t>
             </a:fld>
             <a:endParaRPr lang="es-MX"/>
           </a:p>
@@ -1847,7 +1847,7 @@
           <a:p>
             <a:fld id="{56797478-F4C9-45FC-904A-B410162781D6}" type="datetimeFigureOut">
               <a:rPr lang="es-MX" smtClean="0"/>
-              <a:t>06/06/2024</a:t>
+              <a:t>09/06/2024</a:t>
             </a:fld>
             <a:endParaRPr lang="es-MX"/>
           </a:p>
@@ -1989,7 +1989,7 @@
           <a:p>
             <a:fld id="{56797478-F4C9-45FC-904A-B410162781D6}" type="datetimeFigureOut">
               <a:rPr lang="es-MX" smtClean="0"/>
-              <a:t>06/06/2024</a:t>
+              <a:t>09/06/2024</a:t>
             </a:fld>
             <a:endParaRPr lang="es-MX"/>
           </a:p>
@@ -2102,7 +2102,7 @@
           <a:p>
             <a:fld id="{56797478-F4C9-45FC-904A-B410162781D6}" type="datetimeFigureOut">
               <a:rPr lang="es-MX" smtClean="0"/>
-              <a:t>06/06/2024</a:t>
+              <a:t>09/06/2024</a:t>
             </a:fld>
             <a:endParaRPr lang="es-MX"/>
           </a:p>
@@ -2415,7 +2415,7 @@
           <a:p>
             <a:fld id="{56797478-F4C9-45FC-904A-B410162781D6}" type="datetimeFigureOut">
               <a:rPr lang="es-MX" smtClean="0"/>
-              <a:t>06/06/2024</a:t>
+              <a:t>09/06/2024</a:t>
             </a:fld>
             <a:endParaRPr lang="es-MX"/>
           </a:p>
@@ -2704,7 +2704,7 @@
           <a:p>
             <a:fld id="{56797478-F4C9-45FC-904A-B410162781D6}" type="datetimeFigureOut">
               <a:rPr lang="es-MX" smtClean="0"/>
-              <a:t>06/06/2024</a:t>
+              <a:t>09/06/2024</a:t>
             </a:fld>
             <a:endParaRPr lang="es-MX"/>
           </a:p>
@@ -2947,7 +2947,7 @@
           <a:p>
             <a:fld id="{56797478-F4C9-45FC-904A-B410162781D6}" type="datetimeFigureOut">
               <a:rPr lang="es-MX" smtClean="0"/>
-              <a:t>06/06/2024</a:t>
+              <a:t>09/06/2024</a:t>
             </a:fld>
             <a:endParaRPr lang="es-MX"/>
           </a:p>

</xml_diff>